<commit_message>
Added predictions from XGBoost Model
</commit_message>
<xml_diff>
--- a/Presentation/Neil Sweigard STAT580 SU2022 Project 2 Presentation.pptx
+++ b/Presentation/Neil Sweigard STAT580 SU2022 Project 2 Presentation.pptx
@@ -5,14 +5,17 @@
     <p:sldMasterId id="2147483648" r:id="rId4"/>
   </p:sldMasterIdLst>
   <p:notesMasterIdLst>
-    <p:notesMasterId r:id="rId10"/>
+    <p:notesMasterId r:id="rId13"/>
   </p:notesMasterIdLst>
   <p:sldIdLst>
     <p:sldId id="256" r:id="rId5"/>
     <p:sldId id="261" r:id="rId6"/>
-    <p:sldId id="262" r:id="rId7"/>
-    <p:sldId id="260" r:id="rId8"/>
-    <p:sldId id="259" r:id="rId9"/>
+    <p:sldId id="265" r:id="rId7"/>
+    <p:sldId id="262" r:id="rId8"/>
+    <p:sldId id="263" r:id="rId9"/>
+    <p:sldId id="264" r:id="rId10"/>
+    <p:sldId id="260" r:id="rId11"/>
+    <p:sldId id="259" r:id="rId12"/>
   </p:sldIdLst>
   <p:sldSz cx="9144000" cy="6858000" type="screen4x3"/>
   <p:notesSz cx="6858000" cy="9144000"/>
@@ -334,12 +337,12 @@
             <c:numRef>
               <c:f>Sheet1!$H$5:$H$15</c:f>
               <c:numCache>
-                <c:formatCode>#,,"M"</c:formatCode>
+                <c:formatCode>General</c:formatCode>
                 <c:ptCount val="11"/>
-                <c:pt idx="9">
+                <c:pt idx="9" formatCode="#,,&quot;M&quot;">
                   <c:v>765958842.40503502</c:v>
                 </c:pt>
-                <c:pt idx="10">
+                <c:pt idx="10" formatCode="#,,&quot;M&quot;">
                   <c:v>622660928.16703105</c:v>
                 </c:pt>
               </c:numCache>
@@ -478,24 +481,24 @@
             <c:numRef>
               <c:f>Sheet1!$I$5:$I$15</c:f>
               <c:numCache>
-                <c:formatCode>#,,"M"</c:formatCode>
+                <c:formatCode>General</c:formatCode>
                 <c:ptCount val="11"/>
-                <c:pt idx="2">
+                <c:pt idx="2" formatCode="#,,&quot;M&quot;">
                   <c:v>1068484672.87554</c:v>
                 </c:pt>
-                <c:pt idx="3">
+                <c:pt idx="3" formatCode="#,,&quot;M&quot;">
                   <c:v>1006790080.5051301</c:v>
                 </c:pt>
-                <c:pt idx="5">
+                <c:pt idx="5" formatCode="#,,&quot;M&quot;">
                   <c:v>956447763.39613295</c:v>
                 </c:pt>
-                <c:pt idx="6">
+                <c:pt idx="6" formatCode="#,,&quot;M&quot;">
                   <c:v>915621549.46681297</c:v>
                 </c:pt>
-                <c:pt idx="7">
+                <c:pt idx="7" formatCode="#,,&quot;M&quot;">
                   <c:v>902472200.329983</c:v>
                 </c:pt>
-                <c:pt idx="8">
+                <c:pt idx="8" formatCode="#,,&quot;M&quot;">
                   <c:v>867542532.74363899</c:v>
                 </c:pt>
               </c:numCache>
@@ -724,7 +727,7 @@
         </c:scaling>
         <c:delete val="0"/>
         <c:axPos val="b"/>
-        <c:numFmt formatCode="#,,&quot;M&quot;" sourceLinked="1"/>
+        <c:numFmt formatCode="General" sourceLinked="1"/>
         <c:majorTickMark val="none"/>
         <c:minorTickMark val="none"/>
         <c:tickLblPos val="nextTo"/>
@@ -1459,7 +1462,7 @@
           <a:p>
             <a:fld id="{86007A53-B775-5D4D-835E-81B0F738E6E2}" type="datetimeFigureOut">
               <a:rPr lang="en-US" smtClean="0"/>
-              <a:t>7/30/2022</a:t>
+              <a:t>8/3/2022</a:t>
             </a:fld>
             <a:endParaRPr lang="en-US"/>
           </a:p>
@@ -3281,7 +3284,7 @@
           <a:p>
             <a:fld id="{6FEC4368-C769-8143-B102-F97927FA2E0C}" type="datetimeFigureOut">
               <a:rPr lang="en-US" smtClean="0"/>
-              <a:t>7/30/2022</a:t>
+              <a:t>8/3/2022</a:t>
             </a:fld>
             <a:endParaRPr lang="en-US"/>
           </a:p>
@@ -4288,6 +4291,265 @@
           <p:cNvPr id="2" name="Title 1">
             <a:extLst>
               <a:ext uri="{FF2B5EF4-FFF2-40B4-BE49-F238E27FC236}">
+                <a16:creationId xmlns:a16="http://schemas.microsoft.com/office/drawing/2014/main" id="{F8882CE7-6D9F-8428-3228-3A49D0039B69}"/>
+              </a:ext>
+            </a:extLst>
+          </p:cNvPr>
+          <p:cNvSpPr>
+            <a:spLocks noGrp="1"/>
+          </p:cNvSpPr>
+          <p:nvPr>
+            <p:ph type="title"/>
+          </p:nvPr>
+        </p:nvSpPr>
+        <p:spPr/>
+        <p:txBody>
+          <a:bodyPr/>
+          <a:lstStyle/>
+          <a:p>
+            <a:r>
+              <a:rPr lang="en-US" dirty="0"/>
+              <a:t>Data Quality Remediation and Transformations</a:t>
+            </a:r>
+          </a:p>
+        </p:txBody>
+      </p:sp>
+      <p:sp>
+        <p:nvSpPr>
+          <p:cNvPr id="3" name="Content Placeholder 2">
+            <a:extLst>
+              <a:ext uri="{FF2B5EF4-FFF2-40B4-BE49-F238E27FC236}">
+                <a16:creationId xmlns:a16="http://schemas.microsoft.com/office/drawing/2014/main" id="{92FBF960-F4B5-60BF-F38D-E3AB83EB71B4}"/>
+              </a:ext>
+            </a:extLst>
+          </p:cNvPr>
+          <p:cNvSpPr>
+            <a:spLocks noGrp="1"/>
+          </p:cNvSpPr>
+          <p:nvPr>
+            <p:ph idx="1"/>
+          </p:nvPr>
+        </p:nvSpPr>
+        <p:spPr/>
+        <p:txBody>
+          <a:bodyPr/>
+          <a:lstStyle/>
+          <a:p>
+            <a:r>
+              <a:rPr lang="en-US" dirty="0"/>
+              <a:t>Derived </a:t>
+            </a:r>
+            <a:r>
+              <a:rPr lang="en-US" b="1" dirty="0">
+                <a:solidFill>
+                  <a:schemeClr val="accent1"/>
+                </a:solidFill>
+              </a:rPr>
+              <a:t>Neighborhood</a:t>
+            </a:r>
+            <a:r>
+              <a:rPr lang="en-US" dirty="0"/>
+              <a:t> variable from file names.</a:t>
+            </a:r>
+          </a:p>
+          <a:p>
+            <a:r>
+              <a:rPr lang="en-US" dirty="0"/>
+              <a:t>Split into multiple variables:</a:t>
+            </a:r>
+          </a:p>
+          <a:p>
+            <a:pPr lvl="1"/>
+            <a:r>
+              <a:rPr lang="en-US" dirty="0"/>
+              <a:t>Exterior →  Exterior1st, </a:t>
+            </a:r>
+            <a:r>
+              <a:rPr lang="en-US" dirty="0" err="1"/>
+              <a:t>ExteriorQual</a:t>
+            </a:r>
+            <a:r>
+              <a:rPr lang="en-US" dirty="0"/>
+              <a:t>, </a:t>
+            </a:r>
+            <a:r>
+              <a:rPr lang="en-US" dirty="0" err="1"/>
+              <a:t>ExteriorCond</a:t>
+            </a:r>
+            <a:endParaRPr lang="en-US" dirty="0"/>
+          </a:p>
+          <a:p>
+            <a:pPr lvl="1"/>
+            <a:r>
+              <a:rPr lang="en-US" dirty="0" err="1"/>
+              <a:t>LotInfo</a:t>
+            </a:r>
+            <a:r>
+              <a:rPr lang="en-US" dirty="0"/>
+              <a:t> → </a:t>
+            </a:r>
+            <a:r>
+              <a:rPr lang="en-US" dirty="0" err="1"/>
+              <a:t>LotConfig</a:t>
+            </a:r>
+            <a:r>
+              <a:rPr lang="en-US" dirty="0"/>
+              <a:t>, </a:t>
+            </a:r>
+            <a:r>
+              <a:rPr lang="en-US" dirty="0" err="1"/>
+              <a:t>LotShape</a:t>
+            </a:r>
+            <a:r>
+              <a:rPr lang="en-US" dirty="0"/>
+              <a:t>, </a:t>
+            </a:r>
+            <a:r>
+              <a:rPr lang="en-US" dirty="0" err="1"/>
+              <a:t>LotArea</a:t>
+            </a:r>
+            <a:r>
+              <a:rPr lang="en-US" dirty="0"/>
+              <a:t>, </a:t>
+            </a:r>
+            <a:r>
+              <a:rPr lang="en-US" dirty="0" err="1"/>
+              <a:t>LotFrontage</a:t>
+            </a:r>
+            <a:endParaRPr lang="en-US" dirty="0"/>
+          </a:p>
+          <a:p>
+            <a:r>
+              <a:rPr lang="en-US" dirty="0"/>
+              <a:t>Removed:</a:t>
+            </a:r>
+          </a:p>
+          <a:p>
+            <a:pPr lvl="1"/>
+            <a:r>
+              <a:rPr lang="en-US" dirty="0"/>
+              <a:t>3 full row duplicates</a:t>
+            </a:r>
+          </a:p>
+          <a:p>
+            <a:pPr lvl="1"/>
+            <a:r>
+              <a:rPr lang="en-US" dirty="0" err="1"/>
+              <a:t>Anamoly</a:t>
+            </a:r>
+            <a:r>
+              <a:rPr lang="en-US" dirty="0"/>
+              <a:t> with </a:t>
+            </a:r>
+            <a:r>
+              <a:rPr lang="en-US" dirty="0" err="1"/>
+              <a:t>YrSold</a:t>
+            </a:r>
+            <a:r>
+              <a:rPr lang="en-US" dirty="0"/>
+              <a:t> 2001 and </a:t>
+            </a:r>
+            <a:r>
+              <a:rPr lang="en-US" dirty="0" err="1"/>
+              <a:t>YearBuilt</a:t>
+            </a:r>
+            <a:r>
+              <a:rPr lang="en-US" dirty="0"/>
+              <a:t> 2004</a:t>
+            </a:r>
+          </a:p>
+          <a:p>
+            <a:pPr lvl="1"/>
+            <a:r>
+              <a:rPr lang="en-US" dirty="0"/>
+              <a:t>Utility, </a:t>
+            </a:r>
+            <a:r>
+              <a:rPr lang="en-US" dirty="0" err="1"/>
+              <a:t>BsmtUnfSF</a:t>
+            </a:r>
+            <a:r>
+              <a:rPr lang="en-US" dirty="0"/>
+              <a:t>, and </a:t>
+            </a:r>
+            <a:r>
+              <a:rPr lang="en-US" dirty="0" err="1"/>
+              <a:t>KitchenAbvGr</a:t>
+            </a:r>
+            <a:r>
+              <a:rPr lang="en-US" dirty="0"/>
+              <a:t> columns</a:t>
+            </a:r>
+          </a:p>
+          <a:p>
+            <a:r>
+              <a:rPr lang="en-US" dirty="0"/>
+              <a:t>Filled in empty:</a:t>
+            </a:r>
+          </a:p>
+          <a:p>
+            <a:pPr lvl="1"/>
+            <a:r>
+              <a:rPr lang="en-US" dirty="0" err="1"/>
+              <a:t>BsmtQual</a:t>
+            </a:r>
+            <a:r>
+              <a:rPr lang="en-US" dirty="0"/>
+              <a:t>, BsmtFinType1, and </a:t>
+            </a:r>
+            <a:r>
+              <a:rPr lang="en-US" dirty="0" err="1"/>
+              <a:t>GarageType</a:t>
+            </a:r>
+            <a:r>
+              <a:rPr lang="en-US" dirty="0"/>
+              <a:t> with NA</a:t>
+            </a:r>
+          </a:p>
+          <a:p>
+            <a:pPr lvl="1"/>
+            <a:r>
+              <a:rPr lang="en-US" dirty="0"/>
+              <a:t>LotFR3 with 0</a:t>
+            </a:r>
+          </a:p>
+        </p:txBody>
+      </p:sp>
+    </p:spTree>
+    <p:extLst>
+      <p:ext uri="{BB962C8B-B14F-4D97-AF65-F5344CB8AC3E}">
+        <p14:creationId xmlns:p14="http://schemas.microsoft.com/office/powerpoint/2010/main" val="973978207"/>
+      </p:ext>
+    </p:extLst>
+  </p:cSld>
+  <p:clrMapOvr>
+    <a:masterClrMapping/>
+  </p:clrMapOvr>
+</p:sld>
+</file>
+
+<file path=ppt/slides/slide4.xml><?xml version="1.0" encoding="utf-8"?>
+<p:sld xmlns:a="http://schemas.openxmlformats.org/drawingml/2006/main" xmlns:r="http://schemas.openxmlformats.org/officeDocument/2006/relationships" xmlns:p="http://schemas.openxmlformats.org/presentationml/2006/main">
+  <p:cSld>
+    <p:spTree>
+      <p:nvGrpSpPr>
+        <p:cNvPr id="1" name=""/>
+        <p:cNvGrpSpPr/>
+        <p:nvPr/>
+      </p:nvGrpSpPr>
+      <p:grpSpPr>
+        <a:xfrm>
+          <a:off x="0" y="0"/>
+          <a:ext cx="0" cy="0"/>
+          <a:chOff x="0" y="0"/>
+          <a:chExt cx="0" cy="0"/>
+        </a:xfrm>
+      </p:grpSpPr>
+      <p:sp>
+        <p:nvSpPr>
+          <p:cNvPr id="2" name="Title 1">
+            <a:extLst>
+              <a:ext uri="{FF2B5EF4-FFF2-40B4-BE49-F238E27FC236}">
                 <a16:creationId xmlns:a16="http://schemas.microsoft.com/office/drawing/2014/main" id="{B1573B89-4E7C-2638-2E8E-2D415DDC2E72}"/>
               </a:ext>
             </a:extLst>
@@ -4311,46 +4573,202 @@
           </a:p>
         </p:txBody>
       </p:sp>
-      <p:sp>
-        <p:nvSpPr>
-          <p:cNvPr id="3" name="Content Placeholder 2">
+      <p:graphicFrame>
+        <p:nvGraphicFramePr>
+          <p:cNvPr id="6" name="Table 6">
             <a:extLst>
               <a:ext uri="{FF2B5EF4-FFF2-40B4-BE49-F238E27FC236}">
-                <a16:creationId xmlns:a16="http://schemas.microsoft.com/office/drawing/2014/main" id="{F498EF20-0094-E5C1-8F67-248A7A74E256}"/>
+                <a16:creationId xmlns:a16="http://schemas.microsoft.com/office/drawing/2014/main" id="{DFC911F7-B8DD-0F31-C668-B8D33A0F4936}"/>
               </a:ext>
             </a:extLst>
           </p:cNvPr>
-          <p:cNvSpPr>
-            <a:spLocks noGrp="1"/>
-          </p:cNvSpPr>
+          <p:cNvGraphicFramePr>
+            <a:graphicFrameLocks noGrp="1"/>
+          </p:cNvGraphicFramePr>
           <p:nvPr>
             <p:ph idx="1"/>
+            <p:extLst>
+              <p:ext uri="{D42A27DB-BD31-4B8C-83A1-F6EECF244321}">
+                <p14:modId xmlns:p14="http://schemas.microsoft.com/office/powerpoint/2010/main" val="182280430"/>
+              </p:ext>
+            </p:extLst>
           </p:nvPr>
-        </p:nvSpPr>
-        <p:spPr/>
-        <p:txBody>
-          <a:bodyPr/>
-          <a:lstStyle/>
-          <a:p>
-            <a:r>
-              <a:rPr lang="en-US" dirty="0"/>
-              <a:t>Multiple Linear Regression</a:t>
-            </a:r>
-          </a:p>
-          <a:p>
-            <a:r>
-              <a:rPr lang="en-US" dirty="0"/>
-              <a:t>Shrinkage</a:t>
-            </a:r>
-          </a:p>
-          <a:p>
-            <a:r>
-              <a:rPr lang="en-US" dirty="0"/>
-              <a:t>Tree-Based</a:t>
-            </a:r>
-          </a:p>
-        </p:txBody>
-      </p:sp>
+        </p:nvGraphicFramePr>
+        <p:xfrm>
+          <a:off x="628650" y="1250950"/>
+          <a:ext cx="7886700" cy="1879600"/>
+        </p:xfrm>
+        <a:graphic>
+          <a:graphicData uri="http://schemas.openxmlformats.org/drawingml/2006/table">
+            <a:tbl>
+              <a:tblPr firstRow="1" bandRow="1">
+                <a:tableStyleId>{5C22544A-7EE6-4342-B048-85BDC9FD1C3A}</a:tableStyleId>
+              </a:tblPr>
+              <a:tblGrid>
+                <a:gridCol w="3943350">
+                  <a:extLst>
+                    <a:ext uri="{9D8B030D-6E8A-4147-A177-3AD203B41FA5}">
+                      <a16:colId xmlns:a16="http://schemas.microsoft.com/office/drawing/2014/main" val="3458445092"/>
+                    </a:ext>
+                  </a:extLst>
+                </a:gridCol>
+                <a:gridCol w="3943350">
+                  <a:extLst>
+                    <a:ext uri="{9D8B030D-6E8A-4147-A177-3AD203B41FA5}">
+                      <a16:colId xmlns:a16="http://schemas.microsoft.com/office/drawing/2014/main" val="1642928331"/>
+                    </a:ext>
+                  </a:extLst>
+                </a:gridCol>
+              </a:tblGrid>
+              <a:tr h="370840">
+                <a:tc>
+                  <a:txBody>
+                    <a:bodyPr/>
+                    <a:lstStyle/>
+                    <a:p>
+                      <a:r>
+                        <a:rPr lang="en-US" dirty="0"/>
+                        <a:t>Family</a:t>
+                      </a:r>
+                    </a:p>
+                  </a:txBody>
+                  <a:tcPr/>
+                </a:tc>
+                <a:tc>
+                  <a:txBody>
+                    <a:bodyPr/>
+                    <a:lstStyle/>
+                    <a:p>
+                      <a:r>
+                        <a:rPr lang="en-US" dirty="0"/>
+                        <a:t>Objective</a:t>
+                      </a:r>
+                    </a:p>
+                  </a:txBody>
+                  <a:tcPr/>
+                </a:tc>
+                <a:extLst>
+                  <a:ext uri="{0D108BD9-81ED-4DB2-BD59-A6C34878D82A}">
+                    <a16:rowId xmlns:a16="http://schemas.microsoft.com/office/drawing/2014/main" val="612667786"/>
+                  </a:ext>
+                </a:extLst>
+              </a:tr>
+              <a:tr h="370840">
+                <a:tc>
+                  <a:txBody>
+                    <a:bodyPr/>
+                    <a:lstStyle/>
+                    <a:p>
+                      <a:r>
+                        <a:rPr lang="en-US" dirty="0"/>
+                        <a:t>Linear Regression with Stepwise Selection</a:t>
+                      </a:r>
+                    </a:p>
+                  </a:txBody>
+                  <a:tcPr/>
+                </a:tc>
+                <a:tc>
+                  <a:txBody>
+                    <a:bodyPr/>
+                    <a:lstStyle/>
+                    <a:p>
+                      <a:r>
+                        <a:rPr lang="en-US" dirty="0"/>
+                        <a:t>Add or remove one variable at a time and evaluate model accuracy</a:t>
+                      </a:r>
+                    </a:p>
+                  </a:txBody>
+                  <a:tcPr/>
+                </a:tc>
+                <a:extLst>
+                  <a:ext uri="{0D108BD9-81ED-4DB2-BD59-A6C34878D82A}">
+                    <a16:rowId xmlns:a16="http://schemas.microsoft.com/office/drawing/2014/main" val="3278574768"/>
+                  </a:ext>
+                </a:extLst>
+              </a:tr>
+              <a:tr h="370840">
+                <a:tc>
+                  <a:txBody>
+                    <a:bodyPr/>
+                    <a:lstStyle/>
+                    <a:p>
+                      <a:r>
+                        <a:rPr lang="en-US" dirty="0"/>
+                        <a:t>Shrinkage Methods</a:t>
+                      </a:r>
+                    </a:p>
+                  </a:txBody>
+                  <a:tcPr/>
+                </a:tc>
+                <a:tc>
+                  <a:txBody>
+                    <a:bodyPr/>
+                    <a:lstStyle/>
+                    <a:p>
+                      <a:r>
+                        <a:rPr lang="en-US" dirty="0"/>
+                        <a:t>Shrink the coefficient estimates towards zero by applying a penalty</a:t>
+                      </a:r>
+                    </a:p>
+                  </a:txBody>
+                  <a:tcPr/>
+                </a:tc>
+                <a:extLst>
+                  <a:ext uri="{0D108BD9-81ED-4DB2-BD59-A6C34878D82A}">
+                    <a16:rowId xmlns:a16="http://schemas.microsoft.com/office/drawing/2014/main" val="3356240031"/>
+                  </a:ext>
+                </a:extLst>
+              </a:tr>
+              <a:tr h="370840">
+                <a:tc>
+                  <a:txBody>
+                    <a:bodyPr/>
+                    <a:lstStyle/>
+                    <a:p>
+                      <a:r>
+                        <a:rPr lang="en-US" dirty="0"/>
+                        <a:t>Tree-Based Methods</a:t>
+                      </a:r>
+                    </a:p>
+                  </a:txBody>
+                  <a:tcPr/>
+                </a:tc>
+                <a:tc>
+                  <a:txBody>
+                    <a:bodyPr/>
+                    <a:lstStyle/>
+                    <a:p>
+                      <a:r>
+                        <a:rPr lang="en-US" dirty="0"/>
+                        <a:t>Stratify or segment the </a:t>
+                      </a:r>
+                      <a:r>
+                        <a:rPr lang="en-US"/>
+                        <a:t>predictor variable </a:t>
+                      </a:r>
+                      <a:r>
+                        <a:rPr lang="en-US" dirty="0"/>
+                        <a:t>space into several simple regions with </a:t>
+                      </a:r>
+                      <a:r>
+                        <a:rPr lang="en-US"/>
+                        <a:t>predicted responses</a:t>
+                      </a:r>
+                      <a:endParaRPr lang="en-US" dirty="0"/>
+                    </a:p>
+                  </a:txBody>
+                  <a:tcPr/>
+                </a:tc>
+                <a:extLst>
+                  <a:ext uri="{0D108BD9-81ED-4DB2-BD59-A6C34878D82A}">
+                    <a16:rowId xmlns:a16="http://schemas.microsoft.com/office/drawing/2014/main" val="875855150"/>
+                  </a:ext>
+                </a:extLst>
+              </a:tr>
+            </a:tbl>
+          </a:graphicData>
+        </a:graphic>
+      </p:graphicFrame>
     </p:spTree>
     <p:extLst>
       <p:ext uri="{BB962C8B-B14F-4D97-AF65-F5344CB8AC3E}">
@@ -4364,7 +4782,1447 @@
 </p:sld>
 </file>
 
-<file path=ppt/slides/slide4.xml><?xml version="1.0" encoding="utf-8"?>
+<file path=ppt/slides/slide5.xml><?xml version="1.0" encoding="utf-8"?>
+<p:sld xmlns:a="http://schemas.openxmlformats.org/drawingml/2006/main" xmlns:r="http://schemas.openxmlformats.org/officeDocument/2006/relationships" xmlns:p="http://schemas.openxmlformats.org/presentationml/2006/main">
+  <p:cSld>
+    <p:spTree>
+      <p:nvGrpSpPr>
+        <p:cNvPr id="1" name=""/>
+        <p:cNvGrpSpPr/>
+        <p:nvPr/>
+      </p:nvGrpSpPr>
+      <p:grpSpPr>
+        <a:xfrm>
+          <a:off x="0" y="0"/>
+          <a:ext cx="0" cy="0"/>
+          <a:chOff x="0" y="0"/>
+          <a:chExt cx="0" cy="0"/>
+        </a:xfrm>
+      </p:grpSpPr>
+      <p:sp>
+        <p:nvSpPr>
+          <p:cNvPr id="2" name="Title 1">
+            <a:extLst>
+              <a:ext uri="{FF2B5EF4-FFF2-40B4-BE49-F238E27FC236}">
+                <a16:creationId xmlns:a16="http://schemas.microsoft.com/office/drawing/2014/main" id="{4E25B42D-252E-9477-6A5F-4FDD02A06578}"/>
+              </a:ext>
+            </a:extLst>
+          </p:cNvPr>
+          <p:cNvSpPr>
+            <a:spLocks noGrp="1"/>
+          </p:cNvSpPr>
+          <p:nvPr>
+            <p:ph type="title"/>
+          </p:nvPr>
+        </p:nvSpPr>
+        <p:spPr/>
+        <p:txBody>
+          <a:bodyPr/>
+          <a:lstStyle/>
+          <a:p>
+            <a:r>
+              <a:rPr lang="en-US" dirty="0"/>
+              <a:t>Model Comparison Measure</a:t>
+            </a:r>
+          </a:p>
+        </p:txBody>
+      </p:sp>
+      <mc:AlternateContent xmlns:mc="http://schemas.openxmlformats.org/markup-compatibility/2006">
+        <mc:Choice xmlns:a14="http://schemas.microsoft.com/office/drawing/2010/main" Requires="a14">
+          <p:sp>
+            <p:nvSpPr>
+              <p:cNvPr id="3" name="Content Placeholder 2">
+                <a:extLst>
+                  <a:ext uri="{FF2B5EF4-FFF2-40B4-BE49-F238E27FC236}">
+                    <a16:creationId xmlns:a16="http://schemas.microsoft.com/office/drawing/2014/main" id="{A629A301-01B1-D616-BC56-CDD857C90221}"/>
+                  </a:ext>
+                </a:extLst>
+              </p:cNvPr>
+              <p:cNvSpPr>
+                <a:spLocks noGrp="1"/>
+              </p:cNvSpPr>
+              <p:nvPr>
+                <p:ph idx="1"/>
+              </p:nvPr>
+            </p:nvSpPr>
+            <p:spPr/>
+            <p:txBody>
+              <a:bodyPr/>
+              <a:lstStyle/>
+              <a:p>
+                <a:r>
+                  <a:rPr lang="en-US" b="1" dirty="0"/>
+                  <a:t>Mean Squared Error (MSE)</a:t>
+                </a:r>
+                <a:r>
+                  <a:rPr lang="en-US" dirty="0"/>
+                  <a:t>: The squared distance of each actual observed value </a:t>
+                </a:r>
+                <a14:m>
+                  <m:oMath xmlns:m="http://schemas.openxmlformats.org/officeDocument/2006/math">
+                    <m:sSub>
+                      <m:sSubPr>
+                        <m:ctrlPr>
+                          <a:rPr lang="en-US" i="1" smtClean="0">
+                            <a:latin typeface="Cambria Math" panose="02040503050406030204" pitchFamily="18" charset="0"/>
+                          </a:rPr>
+                        </m:ctrlPr>
+                      </m:sSubPr>
+                      <m:e>
+                        <m:r>
+                          <a:rPr lang="en-US" b="0" i="1" smtClean="0">
+                            <a:latin typeface="Cambria Math" panose="02040503050406030204" pitchFamily="18" charset="0"/>
+                          </a:rPr>
+                          <m:t>𝑦</m:t>
+                        </m:r>
+                      </m:e>
+                      <m:sub>
+                        <m:r>
+                          <a:rPr lang="en-US" b="0" i="1" smtClean="0">
+                            <a:latin typeface="Cambria Math" panose="02040503050406030204" pitchFamily="18" charset="0"/>
+                          </a:rPr>
+                          <m:t>𝑖</m:t>
+                        </m:r>
+                      </m:sub>
+                    </m:sSub>
+                  </m:oMath>
+                </a14:m>
+                <a:r>
+                  <a:rPr lang="en-US" dirty="0"/>
+                  <a:t> from the predicted value divided by the number of observations.</a:t>
+                </a:r>
+              </a:p>
+              <a:p>
+                <a:r>
+                  <a:rPr lang="en-US" dirty="0"/>
+                  <a:t>Measured vertically</a:t>
+                </a:r>
+              </a:p>
+              <a:p>
+                <a:endParaRPr lang="en-US" dirty="0"/>
+              </a:p>
+              <a:p>
+                <a:endParaRPr lang="en-US" dirty="0"/>
+              </a:p>
+              <a:p>
+                <a:endParaRPr lang="en-US" dirty="0"/>
+              </a:p>
+              <a:p>
+                <a:endParaRPr lang="en-US" dirty="0"/>
+              </a:p>
+              <a:p>
+                <a:endParaRPr lang="en-US" dirty="0"/>
+              </a:p>
+              <a:p>
+                <a:pPr marL="0" indent="0" algn="r">
+                  <a:buNone/>
+                </a:pPr>
+                <a:r>
+                  <a:rPr lang="en-US" dirty="0"/>
+                  <a:t> </a:t>
+                </a:r>
+                <a14:m>
+                  <m:oMath xmlns:m="http://schemas.openxmlformats.org/officeDocument/2006/math">
+                    <m:r>
+                      <a:rPr lang="en-US" b="0" i="1" smtClean="0">
+                        <a:solidFill>
+                          <a:schemeClr val="accent1"/>
+                        </a:solidFill>
+                        <a:latin typeface="Cambria Math" panose="02040503050406030204" pitchFamily="18" charset="0"/>
+                      </a:rPr>
+                      <m:t>𝑀𝑆𝐸</m:t>
+                    </m:r>
+                    <m:r>
+                      <a:rPr lang="en-US" b="0" i="1" smtClean="0">
+                        <a:solidFill>
+                          <a:schemeClr val="accent1"/>
+                        </a:solidFill>
+                        <a:latin typeface="Cambria Math" panose="02040503050406030204" pitchFamily="18" charset="0"/>
+                      </a:rPr>
+                      <m:t>=</m:t>
+                    </m:r>
+                    <m:f>
+                      <m:fPr>
+                        <m:ctrlPr>
+                          <a:rPr lang="en-US" b="0" i="1" smtClean="0">
+                            <a:solidFill>
+                              <a:schemeClr val="accent1"/>
+                            </a:solidFill>
+                            <a:latin typeface="Cambria Math" panose="02040503050406030204" pitchFamily="18" charset="0"/>
+                          </a:rPr>
+                        </m:ctrlPr>
+                      </m:fPr>
+                      <m:num>
+                        <m:sSubSup>
+                          <m:sSubSupPr>
+                            <m:ctrlPr>
+                              <a:rPr lang="en-US" i="1">
+                                <a:solidFill>
+                                  <a:schemeClr val="accent1"/>
+                                </a:solidFill>
+                                <a:latin typeface="Cambria Math" panose="02040503050406030204" pitchFamily="18" charset="0"/>
+                              </a:rPr>
+                            </m:ctrlPr>
+                          </m:sSubSupPr>
+                          <m:e>
+                            <m:r>
+                              <a:rPr lang="en-US" i="1">
+                                <a:solidFill>
+                                  <a:schemeClr val="accent1"/>
+                                </a:solidFill>
+                                <a:latin typeface="Cambria Math" panose="02040503050406030204" pitchFamily="18" charset="0"/>
+                              </a:rPr>
+                              <m:t>𝑑</m:t>
+                            </m:r>
+                          </m:e>
+                          <m:sub>
+                            <m:r>
+                              <a:rPr lang="en-US" i="1">
+                                <a:solidFill>
+                                  <a:schemeClr val="accent1"/>
+                                </a:solidFill>
+                                <a:latin typeface="Cambria Math" panose="02040503050406030204" pitchFamily="18" charset="0"/>
+                              </a:rPr>
+                              <m:t>1</m:t>
+                            </m:r>
+                          </m:sub>
+                          <m:sup>
+                            <m:r>
+                              <a:rPr lang="en-US" i="1">
+                                <a:solidFill>
+                                  <a:schemeClr val="accent1"/>
+                                </a:solidFill>
+                                <a:latin typeface="Cambria Math" panose="02040503050406030204" pitchFamily="18" charset="0"/>
+                              </a:rPr>
+                              <m:t>2</m:t>
+                            </m:r>
+                          </m:sup>
+                        </m:sSubSup>
+                        <m:r>
+                          <a:rPr lang="en-US" i="1">
+                            <a:solidFill>
+                              <a:schemeClr val="accent1"/>
+                            </a:solidFill>
+                            <a:latin typeface="Cambria Math" panose="02040503050406030204" pitchFamily="18" charset="0"/>
+                          </a:rPr>
+                          <m:t>+</m:t>
+                        </m:r>
+                        <m:sSubSup>
+                          <m:sSubSupPr>
+                            <m:ctrlPr>
+                              <a:rPr lang="en-US" i="1">
+                                <a:solidFill>
+                                  <a:schemeClr val="accent1"/>
+                                </a:solidFill>
+                                <a:latin typeface="Cambria Math" panose="02040503050406030204" pitchFamily="18" charset="0"/>
+                              </a:rPr>
+                            </m:ctrlPr>
+                          </m:sSubSupPr>
+                          <m:e>
+                            <m:r>
+                              <a:rPr lang="en-US" i="1">
+                                <a:solidFill>
+                                  <a:schemeClr val="accent1"/>
+                                </a:solidFill>
+                                <a:latin typeface="Cambria Math" panose="02040503050406030204" pitchFamily="18" charset="0"/>
+                              </a:rPr>
+                              <m:t>𝑑</m:t>
+                            </m:r>
+                          </m:e>
+                          <m:sub>
+                            <m:r>
+                              <a:rPr lang="en-US" i="1">
+                                <a:solidFill>
+                                  <a:schemeClr val="accent1"/>
+                                </a:solidFill>
+                                <a:latin typeface="Cambria Math" panose="02040503050406030204" pitchFamily="18" charset="0"/>
+                              </a:rPr>
+                              <m:t>2</m:t>
+                            </m:r>
+                          </m:sub>
+                          <m:sup>
+                            <m:r>
+                              <a:rPr lang="en-US" i="1">
+                                <a:solidFill>
+                                  <a:schemeClr val="accent1"/>
+                                </a:solidFill>
+                                <a:latin typeface="Cambria Math" panose="02040503050406030204" pitchFamily="18" charset="0"/>
+                              </a:rPr>
+                              <m:t>2</m:t>
+                            </m:r>
+                          </m:sup>
+                        </m:sSubSup>
+                        <m:r>
+                          <a:rPr lang="en-US" i="1">
+                            <a:solidFill>
+                              <a:schemeClr val="accent1"/>
+                            </a:solidFill>
+                            <a:latin typeface="Cambria Math" panose="02040503050406030204" pitchFamily="18" charset="0"/>
+                          </a:rPr>
+                          <m:t>+</m:t>
+                        </m:r>
+                        <m:sSubSup>
+                          <m:sSubSupPr>
+                            <m:ctrlPr>
+                              <a:rPr lang="en-US" i="1">
+                                <a:solidFill>
+                                  <a:schemeClr val="accent1"/>
+                                </a:solidFill>
+                                <a:latin typeface="Cambria Math" panose="02040503050406030204" pitchFamily="18" charset="0"/>
+                              </a:rPr>
+                            </m:ctrlPr>
+                          </m:sSubSupPr>
+                          <m:e>
+                            <m:r>
+                              <a:rPr lang="en-US" i="1">
+                                <a:solidFill>
+                                  <a:schemeClr val="accent1"/>
+                                </a:solidFill>
+                                <a:latin typeface="Cambria Math" panose="02040503050406030204" pitchFamily="18" charset="0"/>
+                              </a:rPr>
+                              <m:t>𝑑</m:t>
+                            </m:r>
+                          </m:e>
+                          <m:sub>
+                            <m:r>
+                              <a:rPr lang="en-US" i="1">
+                                <a:solidFill>
+                                  <a:schemeClr val="accent1"/>
+                                </a:solidFill>
+                                <a:latin typeface="Cambria Math" panose="02040503050406030204" pitchFamily="18" charset="0"/>
+                              </a:rPr>
+                              <m:t>3</m:t>
+                            </m:r>
+                          </m:sub>
+                          <m:sup>
+                            <m:r>
+                              <a:rPr lang="en-US" i="1">
+                                <a:solidFill>
+                                  <a:schemeClr val="accent1"/>
+                                </a:solidFill>
+                                <a:latin typeface="Cambria Math" panose="02040503050406030204" pitchFamily="18" charset="0"/>
+                              </a:rPr>
+                              <m:t>2</m:t>
+                            </m:r>
+                          </m:sup>
+                        </m:sSubSup>
+                      </m:num>
+                      <m:den>
+                        <m:r>
+                          <a:rPr lang="en-US" b="0" i="1" smtClean="0">
+                            <a:solidFill>
+                              <a:schemeClr val="accent1"/>
+                            </a:solidFill>
+                            <a:latin typeface="Cambria Math" panose="02040503050406030204" pitchFamily="18" charset="0"/>
+                          </a:rPr>
+                          <m:t>3</m:t>
+                        </m:r>
+                      </m:den>
+                    </m:f>
+                  </m:oMath>
+                </a14:m>
+                <a:endParaRPr lang="en-US" dirty="0"/>
+              </a:p>
+              <a:p>
+                <a:endParaRPr lang="en-US" dirty="0"/>
+              </a:p>
+            </p:txBody>
+          </p:sp>
+        </mc:Choice>
+        <mc:Fallback>
+          <p:sp>
+            <p:nvSpPr>
+              <p:cNvPr id="3" name="Content Placeholder 2">
+                <a:extLst>
+                  <a:ext uri="{FF2B5EF4-FFF2-40B4-BE49-F238E27FC236}">
+                    <a16:creationId xmlns:a16="http://schemas.microsoft.com/office/drawing/2014/main" id="{A629A301-01B1-D616-BC56-CDD857C90221}"/>
+                  </a:ext>
+                </a:extLst>
+              </p:cNvPr>
+              <p:cNvSpPr>
+                <a:spLocks noGrp="1" noRot="1" noChangeAspect="1" noMove="1" noResize="1" noEditPoints="1" noAdjustHandles="1" noChangeArrowheads="1" noChangeShapeType="1" noTextEdit="1"/>
+              </p:cNvSpPr>
+              <p:nvPr>
+                <p:ph idx="1"/>
+              </p:nvPr>
+            </p:nvSpPr>
+            <p:spPr>
+              <a:blipFill>
+                <a:blip r:embed="rId2"/>
+                <a:stretch>
+                  <a:fillRect l="-773" t="-1399"/>
+                </a:stretch>
+              </a:blipFill>
+            </p:spPr>
+            <p:txBody>
+              <a:bodyPr/>
+              <a:lstStyle/>
+              <a:p>
+                <a:r>
+                  <a:rPr lang="en-US">
+                    <a:noFill/>
+                  </a:rPr>
+                  <a:t> </a:t>
+                </a:r>
+              </a:p>
+            </p:txBody>
+          </p:sp>
+        </mc:Fallback>
+      </mc:AlternateContent>
+      <p:pic>
+        <p:nvPicPr>
+          <p:cNvPr id="5" name="Picture 4">
+            <a:extLst>
+              <a:ext uri="{FF2B5EF4-FFF2-40B4-BE49-F238E27FC236}">
+                <a16:creationId xmlns:a16="http://schemas.microsoft.com/office/drawing/2014/main" id="{225D9473-6E7E-AE4D-033D-C72DFA1CCAD2}"/>
+              </a:ext>
+            </a:extLst>
+          </p:cNvPr>
+          <p:cNvPicPr>
+            <a:picLocks noChangeAspect="1"/>
+          </p:cNvPicPr>
+          <p:nvPr/>
+        </p:nvPicPr>
+        <p:blipFill>
+          <a:blip r:embed="rId3"/>
+          <a:stretch>
+            <a:fillRect/>
+          </a:stretch>
+        </p:blipFill>
+        <p:spPr>
+          <a:xfrm>
+            <a:off x="628650" y="2518173"/>
+            <a:ext cx="4834497" cy="3525742"/>
+          </a:xfrm>
+          <a:prstGeom prst="rect">
+            <a:avLst/>
+          </a:prstGeom>
+        </p:spPr>
+      </p:pic>
+      <p:cxnSp>
+        <p:nvCxnSpPr>
+          <p:cNvPr id="7" name="Straight Connector 6">
+            <a:extLst>
+              <a:ext uri="{FF2B5EF4-FFF2-40B4-BE49-F238E27FC236}">
+                <a16:creationId xmlns:a16="http://schemas.microsoft.com/office/drawing/2014/main" id="{E0343A97-CF10-C65C-B933-556289034248}"/>
+              </a:ext>
+            </a:extLst>
+          </p:cNvPr>
+          <p:cNvCxnSpPr>
+            <a:cxnSpLocks/>
+          </p:cNvCxnSpPr>
+          <p:nvPr/>
+        </p:nvCxnSpPr>
+        <p:spPr>
+          <a:xfrm>
+            <a:off x="1511968" y="4965032"/>
+            <a:ext cx="0" cy="521368"/>
+          </a:xfrm>
+          <a:prstGeom prst="line">
+            <a:avLst/>
+          </a:prstGeom>
+          <a:ln w="25400" cap="flat">
+            <a:solidFill>
+              <a:schemeClr val="accent1"/>
+            </a:solidFill>
+            <a:prstDash val="solid"/>
+            <a:tailEnd type="triangle"/>
+          </a:ln>
+        </p:spPr>
+        <p:style>
+          <a:lnRef idx="1">
+            <a:schemeClr val="accent1"/>
+          </a:lnRef>
+          <a:fillRef idx="0">
+            <a:schemeClr val="accent1"/>
+          </a:fillRef>
+          <a:effectRef idx="0">
+            <a:schemeClr val="accent1"/>
+          </a:effectRef>
+          <a:fontRef idx="minor">
+            <a:schemeClr val="tx1"/>
+          </a:fontRef>
+        </p:style>
+      </p:cxnSp>
+      <p:cxnSp>
+        <p:nvCxnSpPr>
+          <p:cNvPr id="9" name="Straight Connector 8">
+            <a:extLst>
+              <a:ext uri="{FF2B5EF4-FFF2-40B4-BE49-F238E27FC236}">
+                <a16:creationId xmlns:a16="http://schemas.microsoft.com/office/drawing/2014/main" id="{C1ECF09B-ECD4-74EB-D340-76FA0FDDFEC3}"/>
+              </a:ext>
+            </a:extLst>
+          </p:cNvPr>
+          <p:cNvCxnSpPr>
+            <a:cxnSpLocks/>
+          </p:cNvCxnSpPr>
+          <p:nvPr/>
+        </p:nvCxnSpPr>
+        <p:spPr>
+          <a:xfrm>
+            <a:off x="3302668" y="4431506"/>
+            <a:ext cx="0" cy="350044"/>
+          </a:xfrm>
+          <a:prstGeom prst="line">
+            <a:avLst/>
+          </a:prstGeom>
+          <a:ln w="25400" cap="flat">
+            <a:solidFill>
+              <a:schemeClr val="accent1"/>
+            </a:solidFill>
+            <a:prstDash val="solid"/>
+            <a:headEnd type="triangle"/>
+            <a:tailEnd type="none"/>
+          </a:ln>
+        </p:spPr>
+        <p:style>
+          <a:lnRef idx="1">
+            <a:schemeClr val="accent1"/>
+          </a:lnRef>
+          <a:fillRef idx="0">
+            <a:schemeClr val="accent1"/>
+          </a:fillRef>
+          <a:effectRef idx="0">
+            <a:schemeClr val="accent1"/>
+          </a:effectRef>
+          <a:fontRef idx="minor">
+            <a:schemeClr val="tx1"/>
+          </a:fontRef>
+        </p:style>
+      </p:cxnSp>
+      <p:cxnSp>
+        <p:nvCxnSpPr>
+          <p:cNvPr id="15" name="Straight Connector 14">
+            <a:extLst>
+              <a:ext uri="{FF2B5EF4-FFF2-40B4-BE49-F238E27FC236}">
+                <a16:creationId xmlns:a16="http://schemas.microsoft.com/office/drawing/2014/main" id="{E8985F8C-5122-EF19-A8B1-0D8B81494D3F}"/>
+              </a:ext>
+            </a:extLst>
+          </p:cNvPr>
+          <p:cNvCxnSpPr>
+            <a:cxnSpLocks/>
+          </p:cNvCxnSpPr>
+          <p:nvPr/>
+        </p:nvCxnSpPr>
+        <p:spPr>
+          <a:xfrm>
+            <a:off x="4467252" y="2756221"/>
+            <a:ext cx="0" cy="953767"/>
+          </a:xfrm>
+          <a:prstGeom prst="line">
+            <a:avLst/>
+          </a:prstGeom>
+          <a:ln w="25400" cap="flat">
+            <a:solidFill>
+              <a:schemeClr val="accent1"/>
+            </a:solidFill>
+            <a:prstDash val="solid"/>
+            <a:tailEnd type="triangle"/>
+          </a:ln>
+        </p:spPr>
+        <p:style>
+          <a:lnRef idx="1">
+            <a:schemeClr val="accent1"/>
+          </a:lnRef>
+          <a:fillRef idx="0">
+            <a:schemeClr val="accent1"/>
+          </a:fillRef>
+          <a:effectRef idx="0">
+            <a:schemeClr val="accent1"/>
+          </a:effectRef>
+          <a:fontRef idx="minor">
+            <a:schemeClr val="tx1"/>
+          </a:fontRef>
+        </p:style>
+      </p:cxnSp>
+      <mc:AlternateContent xmlns:mc="http://schemas.openxmlformats.org/markup-compatibility/2006">
+        <mc:Choice xmlns:a14="http://schemas.microsoft.com/office/drawing/2010/main" Requires="a14">
+          <p:sp>
+            <p:nvSpPr>
+              <p:cNvPr id="17" name="TextBox 16">
+                <a:extLst>
+                  <a:ext uri="{FF2B5EF4-FFF2-40B4-BE49-F238E27FC236}">
+                    <a16:creationId xmlns:a16="http://schemas.microsoft.com/office/drawing/2014/main" id="{6284804C-0C2F-8DF2-6799-F857E612A239}"/>
+                  </a:ext>
+                </a:extLst>
+              </p:cNvPr>
+              <p:cNvSpPr txBox="1"/>
+              <p:nvPr/>
+            </p:nvSpPr>
+            <p:spPr>
+              <a:xfrm>
+                <a:off x="1456350" y="4965032"/>
+                <a:ext cx="379139" cy="369332"/>
+              </a:xfrm>
+              <a:prstGeom prst="rect">
+                <a:avLst/>
+              </a:prstGeom>
+              <a:noFill/>
+            </p:spPr>
+            <p:txBody>
+              <a:bodyPr wrap="square" rtlCol="0">
+                <a:spAutoFit/>
+              </a:bodyPr>
+              <a:lstStyle/>
+              <a:p>
+                <a14:m>
+                  <m:oMathPara xmlns:m="http://schemas.openxmlformats.org/officeDocument/2006/math">
+                    <m:oMathParaPr>
+                      <m:jc m:val="centerGroup"/>
+                    </m:oMathParaPr>
+                    <m:oMath xmlns:m="http://schemas.openxmlformats.org/officeDocument/2006/math">
+                      <m:sSub>
+                        <m:sSubPr>
+                          <m:ctrlPr>
+                            <a:rPr lang="en-US" i="1" smtClean="0">
+                              <a:solidFill>
+                                <a:schemeClr val="accent1"/>
+                              </a:solidFill>
+                              <a:latin typeface="Cambria Math" panose="02040503050406030204" pitchFamily="18" charset="0"/>
+                            </a:rPr>
+                          </m:ctrlPr>
+                        </m:sSubPr>
+                        <m:e>
+                          <m:r>
+                            <a:rPr lang="en-US" b="0" i="1" smtClean="0">
+                              <a:solidFill>
+                                <a:schemeClr val="accent1"/>
+                              </a:solidFill>
+                              <a:latin typeface="Cambria Math" panose="02040503050406030204" pitchFamily="18" charset="0"/>
+                            </a:rPr>
+                            <m:t>𝑑</m:t>
+                          </m:r>
+                        </m:e>
+                        <m:sub>
+                          <m:r>
+                            <a:rPr lang="en-US" b="0" i="1" smtClean="0">
+                              <a:solidFill>
+                                <a:schemeClr val="accent1"/>
+                              </a:solidFill>
+                              <a:latin typeface="Cambria Math" panose="02040503050406030204" pitchFamily="18" charset="0"/>
+                            </a:rPr>
+                            <m:t>1</m:t>
+                          </m:r>
+                        </m:sub>
+                      </m:sSub>
+                    </m:oMath>
+                  </m:oMathPara>
+                </a14:m>
+                <a:endParaRPr lang="en-US" dirty="0"/>
+              </a:p>
+            </p:txBody>
+          </p:sp>
+        </mc:Choice>
+        <mc:Fallback>
+          <p:sp>
+            <p:nvSpPr>
+              <p:cNvPr id="17" name="TextBox 16">
+                <a:extLst>
+                  <a:ext uri="{FF2B5EF4-FFF2-40B4-BE49-F238E27FC236}">
+                    <a16:creationId xmlns:a16="http://schemas.microsoft.com/office/drawing/2014/main" id="{6284804C-0C2F-8DF2-6799-F857E612A239}"/>
+                  </a:ext>
+                </a:extLst>
+              </p:cNvPr>
+              <p:cNvSpPr txBox="1">
+                <a:spLocks noRot="1" noChangeAspect="1" noMove="1" noResize="1" noEditPoints="1" noAdjustHandles="1" noChangeArrowheads="1" noChangeShapeType="1" noTextEdit="1"/>
+              </p:cNvSpPr>
+              <p:nvPr/>
+            </p:nvSpPr>
+            <p:spPr>
+              <a:xfrm>
+                <a:off x="1456350" y="4965032"/>
+                <a:ext cx="379139" cy="369332"/>
+              </a:xfrm>
+              <a:prstGeom prst="rect">
+                <a:avLst/>
+              </a:prstGeom>
+              <a:blipFill>
+                <a:blip r:embed="rId4"/>
+                <a:stretch>
+                  <a:fillRect/>
+                </a:stretch>
+              </a:blipFill>
+            </p:spPr>
+            <p:txBody>
+              <a:bodyPr/>
+              <a:lstStyle/>
+              <a:p>
+                <a:r>
+                  <a:rPr lang="en-US">
+                    <a:noFill/>
+                  </a:rPr>
+                  <a:t> </a:t>
+                </a:r>
+              </a:p>
+            </p:txBody>
+          </p:sp>
+        </mc:Fallback>
+      </mc:AlternateContent>
+      <mc:AlternateContent xmlns:mc="http://schemas.openxmlformats.org/markup-compatibility/2006">
+        <mc:Choice xmlns:a14="http://schemas.microsoft.com/office/drawing/2010/main" Requires="a14">
+          <p:sp>
+            <p:nvSpPr>
+              <p:cNvPr id="18" name="TextBox 17">
+                <a:extLst>
+                  <a:ext uri="{FF2B5EF4-FFF2-40B4-BE49-F238E27FC236}">
+                    <a16:creationId xmlns:a16="http://schemas.microsoft.com/office/drawing/2014/main" id="{3B863FE0-5459-45F4-08C2-7AF4DF3FA90D}"/>
+                  </a:ext>
+                </a:extLst>
+              </p:cNvPr>
+              <p:cNvSpPr txBox="1"/>
+              <p:nvPr/>
+            </p:nvSpPr>
+            <p:spPr>
+              <a:xfrm>
+                <a:off x="3259131" y="4417931"/>
+                <a:ext cx="379139" cy="369332"/>
+              </a:xfrm>
+              <a:prstGeom prst="rect">
+                <a:avLst/>
+              </a:prstGeom>
+              <a:noFill/>
+            </p:spPr>
+            <p:txBody>
+              <a:bodyPr wrap="square" rtlCol="0">
+                <a:spAutoFit/>
+              </a:bodyPr>
+              <a:lstStyle/>
+              <a:p>
+                <a14:m>
+                  <m:oMathPara xmlns:m="http://schemas.openxmlformats.org/officeDocument/2006/math">
+                    <m:oMathParaPr>
+                      <m:jc m:val="centerGroup"/>
+                    </m:oMathParaPr>
+                    <m:oMath xmlns:m="http://schemas.openxmlformats.org/officeDocument/2006/math">
+                      <m:sSub>
+                        <m:sSubPr>
+                          <m:ctrlPr>
+                            <a:rPr lang="en-US" i="1" smtClean="0">
+                              <a:solidFill>
+                                <a:schemeClr val="accent1"/>
+                              </a:solidFill>
+                              <a:latin typeface="Cambria Math" panose="02040503050406030204" pitchFamily="18" charset="0"/>
+                            </a:rPr>
+                          </m:ctrlPr>
+                        </m:sSubPr>
+                        <m:e>
+                          <m:r>
+                            <a:rPr lang="en-US" b="0" i="1" smtClean="0">
+                              <a:solidFill>
+                                <a:schemeClr val="accent1"/>
+                              </a:solidFill>
+                              <a:latin typeface="Cambria Math" panose="02040503050406030204" pitchFamily="18" charset="0"/>
+                            </a:rPr>
+                            <m:t>𝑑</m:t>
+                          </m:r>
+                        </m:e>
+                        <m:sub>
+                          <m:r>
+                            <a:rPr lang="en-US" b="0" i="1" smtClean="0">
+                              <a:solidFill>
+                                <a:schemeClr val="accent1"/>
+                              </a:solidFill>
+                              <a:latin typeface="Cambria Math" panose="02040503050406030204" pitchFamily="18" charset="0"/>
+                            </a:rPr>
+                            <m:t>2</m:t>
+                          </m:r>
+                        </m:sub>
+                      </m:sSub>
+                    </m:oMath>
+                  </m:oMathPara>
+                </a14:m>
+                <a:endParaRPr lang="en-US" dirty="0"/>
+              </a:p>
+            </p:txBody>
+          </p:sp>
+        </mc:Choice>
+        <mc:Fallback>
+          <p:sp>
+            <p:nvSpPr>
+              <p:cNvPr id="18" name="TextBox 17">
+                <a:extLst>
+                  <a:ext uri="{FF2B5EF4-FFF2-40B4-BE49-F238E27FC236}">
+                    <a16:creationId xmlns:a16="http://schemas.microsoft.com/office/drawing/2014/main" id="{3B863FE0-5459-45F4-08C2-7AF4DF3FA90D}"/>
+                  </a:ext>
+                </a:extLst>
+              </p:cNvPr>
+              <p:cNvSpPr txBox="1">
+                <a:spLocks noRot="1" noChangeAspect="1" noMove="1" noResize="1" noEditPoints="1" noAdjustHandles="1" noChangeArrowheads="1" noChangeShapeType="1" noTextEdit="1"/>
+              </p:cNvSpPr>
+              <p:nvPr/>
+            </p:nvSpPr>
+            <p:spPr>
+              <a:xfrm>
+                <a:off x="3259131" y="4417931"/>
+                <a:ext cx="379139" cy="369332"/>
+              </a:xfrm>
+              <a:prstGeom prst="rect">
+                <a:avLst/>
+              </a:prstGeom>
+              <a:blipFill>
+                <a:blip r:embed="rId5"/>
+                <a:stretch>
+                  <a:fillRect b="-1667"/>
+                </a:stretch>
+              </a:blipFill>
+            </p:spPr>
+            <p:txBody>
+              <a:bodyPr/>
+              <a:lstStyle/>
+              <a:p>
+                <a:r>
+                  <a:rPr lang="en-US">
+                    <a:noFill/>
+                  </a:rPr>
+                  <a:t> </a:t>
+                </a:r>
+              </a:p>
+            </p:txBody>
+          </p:sp>
+        </mc:Fallback>
+      </mc:AlternateContent>
+      <mc:AlternateContent xmlns:mc="http://schemas.openxmlformats.org/markup-compatibility/2006">
+        <mc:Choice xmlns:a14="http://schemas.microsoft.com/office/drawing/2010/main" Requires="a14">
+          <p:sp>
+            <p:nvSpPr>
+              <p:cNvPr id="19" name="TextBox 18">
+                <a:extLst>
+                  <a:ext uri="{FF2B5EF4-FFF2-40B4-BE49-F238E27FC236}">
+                    <a16:creationId xmlns:a16="http://schemas.microsoft.com/office/drawing/2014/main" id="{C89A5A00-15C6-63CA-5A48-030C3436B7E3}"/>
+                  </a:ext>
+                </a:extLst>
+              </p:cNvPr>
+              <p:cNvSpPr txBox="1"/>
+              <p:nvPr/>
+            </p:nvSpPr>
+            <p:spPr>
+              <a:xfrm>
+                <a:off x="4437933" y="2919951"/>
+                <a:ext cx="379139" cy="369332"/>
+              </a:xfrm>
+              <a:prstGeom prst="rect">
+                <a:avLst/>
+              </a:prstGeom>
+              <a:noFill/>
+            </p:spPr>
+            <p:txBody>
+              <a:bodyPr wrap="square" rtlCol="0">
+                <a:spAutoFit/>
+              </a:bodyPr>
+              <a:lstStyle/>
+              <a:p>
+                <a14:m>
+                  <m:oMathPara xmlns:m="http://schemas.openxmlformats.org/officeDocument/2006/math">
+                    <m:oMathParaPr>
+                      <m:jc m:val="centerGroup"/>
+                    </m:oMathParaPr>
+                    <m:oMath xmlns:m="http://schemas.openxmlformats.org/officeDocument/2006/math">
+                      <m:sSub>
+                        <m:sSubPr>
+                          <m:ctrlPr>
+                            <a:rPr lang="en-US" i="1" smtClean="0">
+                              <a:solidFill>
+                                <a:schemeClr val="accent1"/>
+                              </a:solidFill>
+                              <a:latin typeface="Cambria Math" panose="02040503050406030204" pitchFamily="18" charset="0"/>
+                            </a:rPr>
+                          </m:ctrlPr>
+                        </m:sSubPr>
+                        <m:e>
+                          <m:r>
+                            <a:rPr lang="en-US" b="0" i="1" smtClean="0">
+                              <a:solidFill>
+                                <a:schemeClr val="accent1"/>
+                              </a:solidFill>
+                              <a:latin typeface="Cambria Math" panose="02040503050406030204" pitchFamily="18" charset="0"/>
+                            </a:rPr>
+                            <m:t>𝑑</m:t>
+                          </m:r>
+                        </m:e>
+                        <m:sub>
+                          <m:r>
+                            <a:rPr lang="en-US" b="0" i="1" smtClean="0">
+                              <a:solidFill>
+                                <a:schemeClr val="accent1"/>
+                              </a:solidFill>
+                              <a:latin typeface="Cambria Math" panose="02040503050406030204" pitchFamily="18" charset="0"/>
+                            </a:rPr>
+                            <m:t>3</m:t>
+                          </m:r>
+                        </m:sub>
+                      </m:sSub>
+                    </m:oMath>
+                  </m:oMathPara>
+                </a14:m>
+                <a:endParaRPr lang="en-US" dirty="0"/>
+              </a:p>
+            </p:txBody>
+          </p:sp>
+        </mc:Choice>
+        <mc:Fallback>
+          <p:sp>
+            <p:nvSpPr>
+              <p:cNvPr id="19" name="TextBox 18">
+                <a:extLst>
+                  <a:ext uri="{FF2B5EF4-FFF2-40B4-BE49-F238E27FC236}">
+                    <a16:creationId xmlns:a16="http://schemas.microsoft.com/office/drawing/2014/main" id="{C89A5A00-15C6-63CA-5A48-030C3436B7E3}"/>
+                  </a:ext>
+                </a:extLst>
+              </p:cNvPr>
+              <p:cNvSpPr txBox="1">
+                <a:spLocks noRot="1" noChangeAspect="1" noMove="1" noResize="1" noEditPoints="1" noAdjustHandles="1" noChangeArrowheads="1" noChangeShapeType="1" noTextEdit="1"/>
+              </p:cNvSpPr>
+              <p:nvPr/>
+            </p:nvSpPr>
+            <p:spPr>
+              <a:xfrm>
+                <a:off x="4437933" y="2919951"/>
+                <a:ext cx="379139" cy="369332"/>
+              </a:xfrm>
+              <a:prstGeom prst="rect">
+                <a:avLst/>
+              </a:prstGeom>
+              <a:blipFill>
+                <a:blip r:embed="rId6"/>
+                <a:stretch>
+                  <a:fillRect r="-1613"/>
+                </a:stretch>
+              </a:blipFill>
+            </p:spPr>
+            <p:txBody>
+              <a:bodyPr/>
+              <a:lstStyle/>
+              <a:p>
+                <a:r>
+                  <a:rPr lang="en-US">
+                    <a:noFill/>
+                  </a:rPr>
+                  <a:t> </a:t>
+                </a:r>
+              </a:p>
+            </p:txBody>
+          </p:sp>
+        </mc:Fallback>
+      </mc:AlternateContent>
+      <mc:AlternateContent xmlns:mc="http://schemas.openxmlformats.org/markup-compatibility/2006">
+        <mc:Choice xmlns:a14="http://schemas.microsoft.com/office/drawing/2010/main" Requires="a14">
+          <p:sp>
+            <p:nvSpPr>
+              <p:cNvPr id="21" name="TextBox 20">
+                <a:extLst>
+                  <a:ext uri="{FF2B5EF4-FFF2-40B4-BE49-F238E27FC236}">
+                    <a16:creationId xmlns:a16="http://schemas.microsoft.com/office/drawing/2014/main" id="{955E21FC-D483-6BB7-4A52-AF53CCDC4381}"/>
+                  </a:ext>
+                </a:extLst>
+              </p:cNvPr>
+              <p:cNvSpPr txBox="1"/>
+              <p:nvPr/>
+            </p:nvSpPr>
+            <p:spPr>
+              <a:xfrm>
+                <a:off x="1342469" y="4407517"/>
+                <a:ext cx="338998" cy="369332"/>
+              </a:xfrm>
+              <a:prstGeom prst="rect">
+                <a:avLst/>
+              </a:prstGeom>
+              <a:noFill/>
+            </p:spPr>
+            <p:txBody>
+              <a:bodyPr wrap="square" rtlCol="0">
+                <a:spAutoFit/>
+              </a:bodyPr>
+              <a:lstStyle/>
+              <a:p>
+                <a14:m>
+                  <m:oMathPara xmlns:m="http://schemas.openxmlformats.org/officeDocument/2006/math">
+                    <m:oMathParaPr>
+                      <m:jc m:val="centerGroup"/>
+                    </m:oMathParaPr>
+                    <m:oMath xmlns:m="http://schemas.openxmlformats.org/officeDocument/2006/math">
+                      <m:sSub>
+                        <m:sSubPr>
+                          <m:ctrlPr>
+                            <a:rPr lang="en-US" i="1" smtClean="0">
+                              <a:latin typeface="Cambria Math" panose="02040503050406030204" pitchFamily="18" charset="0"/>
+                            </a:rPr>
+                          </m:ctrlPr>
+                        </m:sSubPr>
+                        <m:e>
+                          <m:r>
+                            <a:rPr lang="en-US" b="0" i="1" smtClean="0">
+                              <a:latin typeface="Cambria Math" panose="02040503050406030204" pitchFamily="18" charset="0"/>
+                            </a:rPr>
+                            <m:t>𝑦</m:t>
+                          </m:r>
+                        </m:e>
+                        <m:sub>
+                          <m:r>
+                            <a:rPr lang="en-US" b="0" i="1" smtClean="0">
+                              <a:latin typeface="Cambria Math" panose="02040503050406030204" pitchFamily="18" charset="0"/>
+                            </a:rPr>
+                            <m:t>1</m:t>
+                          </m:r>
+                        </m:sub>
+                      </m:sSub>
+                    </m:oMath>
+                  </m:oMathPara>
+                </a14:m>
+                <a:endParaRPr lang="en-US" dirty="0"/>
+              </a:p>
+            </p:txBody>
+          </p:sp>
+        </mc:Choice>
+        <mc:Fallback>
+          <p:sp>
+            <p:nvSpPr>
+              <p:cNvPr id="21" name="TextBox 20">
+                <a:extLst>
+                  <a:ext uri="{FF2B5EF4-FFF2-40B4-BE49-F238E27FC236}">
+                    <a16:creationId xmlns:a16="http://schemas.microsoft.com/office/drawing/2014/main" id="{955E21FC-D483-6BB7-4A52-AF53CCDC4381}"/>
+                  </a:ext>
+                </a:extLst>
+              </p:cNvPr>
+              <p:cNvSpPr txBox="1">
+                <a:spLocks noRot="1" noChangeAspect="1" noMove="1" noResize="1" noEditPoints="1" noAdjustHandles="1" noChangeArrowheads="1" noChangeShapeType="1" noTextEdit="1"/>
+              </p:cNvSpPr>
+              <p:nvPr/>
+            </p:nvSpPr>
+            <p:spPr>
+              <a:xfrm>
+                <a:off x="1342469" y="4407517"/>
+                <a:ext cx="338998" cy="369332"/>
+              </a:xfrm>
+              <a:prstGeom prst="rect">
+                <a:avLst/>
+              </a:prstGeom>
+              <a:blipFill>
+                <a:blip r:embed="rId7"/>
+                <a:stretch>
+                  <a:fillRect r="-7143" b="-8197"/>
+                </a:stretch>
+              </a:blipFill>
+            </p:spPr>
+            <p:txBody>
+              <a:bodyPr/>
+              <a:lstStyle/>
+              <a:p>
+                <a:r>
+                  <a:rPr lang="en-US">
+                    <a:noFill/>
+                  </a:rPr>
+                  <a:t> </a:t>
+                </a:r>
+              </a:p>
+            </p:txBody>
+          </p:sp>
+        </mc:Fallback>
+      </mc:AlternateContent>
+      <mc:AlternateContent xmlns:mc="http://schemas.openxmlformats.org/markup-compatibility/2006">
+        <mc:Choice xmlns:a14="http://schemas.microsoft.com/office/drawing/2010/main" Requires="a14">
+          <p:sp>
+            <p:nvSpPr>
+              <p:cNvPr id="22" name="TextBox 21">
+                <a:extLst>
+                  <a:ext uri="{FF2B5EF4-FFF2-40B4-BE49-F238E27FC236}">
+                    <a16:creationId xmlns:a16="http://schemas.microsoft.com/office/drawing/2014/main" id="{0B45ADD3-AF14-5DF3-8C7F-303CA03AF4BC}"/>
+                  </a:ext>
+                </a:extLst>
+              </p:cNvPr>
+              <p:cNvSpPr txBox="1"/>
+              <p:nvPr/>
+            </p:nvSpPr>
+            <p:spPr>
+              <a:xfrm>
+                <a:off x="3104039" y="4880187"/>
+                <a:ext cx="338998" cy="369332"/>
+              </a:xfrm>
+              <a:prstGeom prst="rect">
+                <a:avLst/>
+              </a:prstGeom>
+              <a:noFill/>
+            </p:spPr>
+            <p:txBody>
+              <a:bodyPr wrap="square" rtlCol="0">
+                <a:spAutoFit/>
+              </a:bodyPr>
+              <a:lstStyle/>
+              <a:p>
+                <a14:m>
+                  <m:oMathPara xmlns:m="http://schemas.openxmlformats.org/officeDocument/2006/math">
+                    <m:oMathParaPr>
+                      <m:jc m:val="centerGroup"/>
+                    </m:oMathParaPr>
+                    <m:oMath xmlns:m="http://schemas.openxmlformats.org/officeDocument/2006/math">
+                      <m:sSub>
+                        <m:sSubPr>
+                          <m:ctrlPr>
+                            <a:rPr lang="en-US" i="1" smtClean="0">
+                              <a:latin typeface="Cambria Math" panose="02040503050406030204" pitchFamily="18" charset="0"/>
+                            </a:rPr>
+                          </m:ctrlPr>
+                        </m:sSubPr>
+                        <m:e>
+                          <m:r>
+                            <a:rPr lang="en-US" b="0" i="1" smtClean="0">
+                              <a:latin typeface="Cambria Math" panose="02040503050406030204" pitchFamily="18" charset="0"/>
+                            </a:rPr>
+                            <m:t>𝑦</m:t>
+                          </m:r>
+                        </m:e>
+                        <m:sub>
+                          <m:r>
+                            <a:rPr lang="en-US" b="0" i="1" smtClean="0">
+                              <a:latin typeface="Cambria Math" panose="02040503050406030204" pitchFamily="18" charset="0"/>
+                            </a:rPr>
+                            <m:t>2</m:t>
+                          </m:r>
+                        </m:sub>
+                      </m:sSub>
+                    </m:oMath>
+                  </m:oMathPara>
+                </a14:m>
+                <a:endParaRPr lang="en-US" dirty="0"/>
+              </a:p>
+            </p:txBody>
+          </p:sp>
+        </mc:Choice>
+        <mc:Fallback>
+          <p:sp>
+            <p:nvSpPr>
+              <p:cNvPr id="22" name="TextBox 21">
+                <a:extLst>
+                  <a:ext uri="{FF2B5EF4-FFF2-40B4-BE49-F238E27FC236}">
+                    <a16:creationId xmlns:a16="http://schemas.microsoft.com/office/drawing/2014/main" id="{0B45ADD3-AF14-5DF3-8C7F-303CA03AF4BC}"/>
+                  </a:ext>
+                </a:extLst>
+              </p:cNvPr>
+              <p:cNvSpPr txBox="1">
+                <a:spLocks noRot="1" noChangeAspect="1" noMove="1" noResize="1" noEditPoints="1" noAdjustHandles="1" noChangeArrowheads="1" noChangeShapeType="1" noTextEdit="1"/>
+              </p:cNvSpPr>
+              <p:nvPr/>
+            </p:nvSpPr>
+            <p:spPr>
+              <a:xfrm>
+                <a:off x="3104039" y="4880187"/>
+                <a:ext cx="338998" cy="369332"/>
+              </a:xfrm>
+              <a:prstGeom prst="rect">
+                <a:avLst/>
+              </a:prstGeom>
+              <a:blipFill>
+                <a:blip r:embed="rId8"/>
+                <a:stretch>
+                  <a:fillRect r="-8929" b="-8333"/>
+                </a:stretch>
+              </a:blipFill>
+            </p:spPr>
+            <p:txBody>
+              <a:bodyPr/>
+              <a:lstStyle/>
+              <a:p>
+                <a:r>
+                  <a:rPr lang="en-US">
+                    <a:noFill/>
+                  </a:rPr>
+                  <a:t> </a:t>
+                </a:r>
+              </a:p>
+            </p:txBody>
+          </p:sp>
+        </mc:Fallback>
+      </mc:AlternateContent>
+      <mc:AlternateContent xmlns:mc="http://schemas.openxmlformats.org/markup-compatibility/2006">
+        <mc:Choice xmlns:a14="http://schemas.microsoft.com/office/drawing/2010/main" Requires="a14">
+          <p:sp>
+            <p:nvSpPr>
+              <p:cNvPr id="23" name="TextBox 22">
+                <a:extLst>
+                  <a:ext uri="{FF2B5EF4-FFF2-40B4-BE49-F238E27FC236}">
+                    <a16:creationId xmlns:a16="http://schemas.microsoft.com/office/drawing/2014/main" id="{0BED2D8A-3BE2-5719-46C0-A752BE53661F}"/>
+                  </a:ext>
+                </a:extLst>
+              </p:cNvPr>
+              <p:cNvSpPr txBox="1"/>
+              <p:nvPr/>
+            </p:nvSpPr>
+            <p:spPr>
+              <a:xfrm>
+                <a:off x="4288504" y="2186000"/>
+                <a:ext cx="338998" cy="369332"/>
+              </a:xfrm>
+              <a:prstGeom prst="rect">
+                <a:avLst/>
+              </a:prstGeom>
+              <a:noFill/>
+            </p:spPr>
+            <p:txBody>
+              <a:bodyPr wrap="square" rtlCol="0">
+                <a:spAutoFit/>
+              </a:bodyPr>
+              <a:lstStyle/>
+              <a:p>
+                <a14:m>
+                  <m:oMathPara xmlns:m="http://schemas.openxmlformats.org/officeDocument/2006/math">
+                    <m:oMathParaPr>
+                      <m:jc m:val="centerGroup"/>
+                    </m:oMathParaPr>
+                    <m:oMath xmlns:m="http://schemas.openxmlformats.org/officeDocument/2006/math">
+                      <m:sSub>
+                        <m:sSubPr>
+                          <m:ctrlPr>
+                            <a:rPr lang="en-US" i="1" smtClean="0">
+                              <a:latin typeface="Cambria Math" panose="02040503050406030204" pitchFamily="18" charset="0"/>
+                            </a:rPr>
+                          </m:ctrlPr>
+                        </m:sSubPr>
+                        <m:e>
+                          <m:r>
+                            <a:rPr lang="en-US" b="0" i="1" smtClean="0">
+                              <a:latin typeface="Cambria Math" panose="02040503050406030204" pitchFamily="18" charset="0"/>
+                            </a:rPr>
+                            <m:t>𝑦</m:t>
+                          </m:r>
+                        </m:e>
+                        <m:sub>
+                          <m:r>
+                            <a:rPr lang="en-US" b="0" i="1" smtClean="0">
+                              <a:latin typeface="Cambria Math" panose="02040503050406030204" pitchFamily="18" charset="0"/>
+                            </a:rPr>
+                            <m:t>3</m:t>
+                          </m:r>
+                        </m:sub>
+                      </m:sSub>
+                    </m:oMath>
+                  </m:oMathPara>
+                </a14:m>
+                <a:endParaRPr lang="en-US" dirty="0"/>
+              </a:p>
+            </p:txBody>
+          </p:sp>
+        </mc:Choice>
+        <mc:Fallback>
+          <p:sp>
+            <p:nvSpPr>
+              <p:cNvPr id="23" name="TextBox 22">
+                <a:extLst>
+                  <a:ext uri="{FF2B5EF4-FFF2-40B4-BE49-F238E27FC236}">
+                    <a16:creationId xmlns:a16="http://schemas.microsoft.com/office/drawing/2014/main" id="{0BED2D8A-3BE2-5719-46C0-A752BE53661F}"/>
+                  </a:ext>
+                </a:extLst>
+              </p:cNvPr>
+              <p:cNvSpPr txBox="1">
+                <a:spLocks noRot="1" noChangeAspect="1" noMove="1" noResize="1" noEditPoints="1" noAdjustHandles="1" noChangeArrowheads="1" noChangeShapeType="1" noTextEdit="1"/>
+              </p:cNvSpPr>
+              <p:nvPr/>
+            </p:nvSpPr>
+            <p:spPr>
+              <a:xfrm>
+                <a:off x="4288504" y="2186000"/>
+                <a:ext cx="338998" cy="369332"/>
+              </a:xfrm>
+              <a:prstGeom prst="rect">
+                <a:avLst/>
+              </a:prstGeom>
+              <a:blipFill>
+                <a:blip r:embed="rId9"/>
+                <a:stretch>
+                  <a:fillRect r="-8929" b="-8333"/>
+                </a:stretch>
+              </a:blipFill>
+            </p:spPr>
+            <p:txBody>
+              <a:bodyPr/>
+              <a:lstStyle/>
+              <a:p>
+                <a:r>
+                  <a:rPr lang="en-US">
+                    <a:noFill/>
+                  </a:rPr>
+                  <a:t> </a:t>
+                </a:r>
+              </a:p>
+            </p:txBody>
+          </p:sp>
+        </mc:Fallback>
+      </mc:AlternateContent>
+    </p:spTree>
+    <p:extLst>
+      <p:ext uri="{BB962C8B-B14F-4D97-AF65-F5344CB8AC3E}">
+        <p14:creationId xmlns:p14="http://schemas.microsoft.com/office/powerpoint/2010/main" val="1660442961"/>
+      </p:ext>
+    </p:extLst>
+  </p:cSld>
+  <p:clrMapOvr>
+    <a:masterClrMapping/>
+  </p:clrMapOvr>
+</p:sld>
+</file>
+
+<file path=ppt/slides/slide6.xml><?xml version="1.0" encoding="utf-8"?>
+<p:sld xmlns:a="http://schemas.openxmlformats.org/drawingml/2006/main" xmlns:r="http://schemas.openxmlformats.org/officeDocument/2006/relationships" xmlns:p="http://schemas.openxmlformats.org/presentationml/2006/main">
+  <p:cSld>
+    <p:spTree>
+      <p:nvGrpSpPr>
+        <p:cNvPr id="1" name=""/>
+        <p:cNvGrpSpPr/>
+        <p:nvPr/>
+      </p:nvGrpSpPr>
+      <p:grpSpPr>
+        <a:xfrm>
+          <a:off x="0" y="0"/>
+          <a:ext cx="0" cy="0"/>
+          <a:chOff x="0" y="0"/>
+          <a:chExt cx="0" cy="0"/>
+        </a:xfrm>
+      </p:grpSpPr>
+      <p:sp>
+        <p:nvSpPr>
+          <p:cNvPr id="2" name="Title 1">
+            <a:extLst>
+              <a:ext uri="{FF2B5EF4-FFF2-40B4-BE49-F238E27FC236}">
+                <a16:creationId xmlns:a16="http://schemas.microsoft.com/office/drawing/2014/main" id="{2FE1A102-D8EF-99F5-B704-EAB1189B1121}"/>
+              </a:ext>
+            </a:extLst>
+          </p:cNvPr>
+          <p:cNvSpPr>
+            <a:spLocks noGrp="1"/>
+          </p:cNvSpPr>
+          <p:nvPr>
+            <p:ph type="title"/>
+          </p:nvPr>
+        </p:nvSpPr>
+        <p:spPr/>
+        <p:txBody>
+          <a:bodyPr/>
+          <a:lstStyle/>
+          <a:p>
+            <a:r>
+              <a:rPr lang="en-US" dirty="0"/>
+              <a:t>Training and Validation Split</a:t>
+            </a:r>
+          </a:p>
+        </p:txBody>
+      </p:sp>
+      <p:graphicFrame>
+        <p:nvGraphicFramePr>
+          <p:cNvPr id="4" name="Table 4">
+            <a:extLst>
+              <a:ext uri="{FF2B5EF4-FFF2-40B4-BE49-F238E27FC236}">
+                <a16:creationId xmlns:a16="http://schemas.microsoft.com/office/drawing/2014/main" id="{897E55F5-DD68-6319-99BD-D235B5DB8CC0}"/>
+              </a:ext>
+            </a:extLst>
+          </p:cNvPr>
+          <p:cNvGraphicFramePr>
+            <a:graphicFrameLocks noGrp="1"/>
+          </p:cNvGraphicFramePr>
+          <p:nvPr>
+            <p:ph idx="1"/>
+            <p:extLst>
+              <p:ext uri="{D42A27DB-BD31-4B8C-83A1-F6EECF244321}">
+                <p14:modId xmlns:p14="http://schemas.microsoft.com/office/powerpoint/2010/main" val="2134705225"/>
+              </p:ext>
+            </p:extLst>
+          </p:nvPr>
+        </p:nvGraphicFramePr>
+        <p:xfrm>
+          <a:off x="628650" y="1250950"/>
+          <a:ext cx="7886700" cy="741680"/>
+        </p:xfrm>
+        <a:graphic>
+          <a:graphicData uri="http://schemas.openxmlformats.org/drawingml/2006/table">
+            <a:tbl>
+              <a:tblPr firstRow="1" bandRow="1">
+                <a:tableStyleId>{5C22544A-7EE6-4342-B048-85BDC9FD1C3A}</a:tableStyleId>
+              </a:tblPr>
+              <a:tblGrid>
+                <a:gridCol w="3943350">
+                  <a:extLst>
+                    <a:ext uri="{9D8B030D-6E8A-4147-A177-3AD203B41FA5}">
+                      <a16:colId xmlns:a16="http://schemas.microsoft.com/office/drawing/2014/main" val="2883164456"/>
+                    </a:ext>
+                  </a:extLst>
+                </a:gridCol>
+                <a:gridCol w="3943350">
+                  <a:extLst>
+                    <a:ext uri="{9D8B030D-6E8A-4147-A177-3AD203B41FA5}">
+                      <a16:colId xmlns:a16="http://schemas.microsoft.com/office/drawing/2014/main" val="3947304183"/>
+                    </a:ext>
+                  </a:extLst>
+                </a:gridCol>
+              </a:tblGrid>
+              <a:tr h="370840">
+                <a:tc>
+                  <a:txBody>
+                    <a:bodyPr/>
+                    <a:lstStyle/>
+                    <a:p>
+                      <a:endParaRPr lang="en-US" dirty="0"/>
+                    </a:p>
+                  </a:txBody>
+                  <a:tcPr/>
+                </a:tc>
+                <a:tc>
+                  <a:txBody>
+                    <a:bodyPr/>
+                    <a:lstStyle/>
+                    <a:p>
+                      <a:endParaRPr lang="en-US"/>
+                    </a:p>
+                  </a:txBody>
+                  <a:tcPr/>
+                </a:tc>
+                <a:extLst>
+                  <a:ext uri="{0D108BD9-81ED-4DB2-BD59-A6C34878D82A}">
+                    <a16:rowId xmlns:a16="http://schemas.microsoft.com/office/drawing/2014/main" val="3466158129"/>
+                  </a:ext>
+                </a:extLst>
+              </a:tr>
+              <a:tr h="370840">
+                <a:tc>
+                  <a:txBody>
+                    <a:bodyPr/>
+                    <a:lstStyle/>
+                    <a:p>
+                      <a:endParaRPr lang="en-US"/>
+                    </a:p>
+                  </a:txBody>
+                  <a:tcPr/>
+                </a:tc>
+                <a:tc>
+                  <a:txBody>
+                    <a:bodyPr/>
+                    <a:lstStyle/>
+                    <a:p>
+                      <a:endParaRPr lang="en-US" dirty="0"/>
+                    </a:p>
+                  </a:txBody>
+                  <a:tcPr/>
+                </a:tc>
+                <a:extLst>
+                  <a:ext uri="{0D108BD9-81ED-4DB2-BD59-A6C34878D82A}">
+                    <a16:rowId xmlns:a16="http://schemas.microsoft.com/office/drawing/2014/main" val="1026522003"/>
+                  </a:ext>
+                </a:extLst>
+              </a:tr>
+            </a:tbl>
+          </a:graphicData>
+        </a:graphic>
+      </p:graphicFrame>
+    </p:spTree>
+    <p:extLst>
+      <p:ext uri="{BB962C8B-B14F-4D97-AF65-F5344CB8AC3E}">
+        <p14:creationId xmlns:p14="http://schemas.microsoft.com/office/powerpoint/2010/main" val="2720523477"/>
+      </p:ext>
+    </p:extLst>
+  </p:cSld>
+  <p:clrMapOvr>
+    <a:masterClrMapping/>
+  </p:clrMapOvr>
+</p:sld>
+</file>
+
+<file path=ppt/slides/slide7.xml><?xml version="1.0" encoding="utf-8"?>
 <p:sld xmlns:a="http://schemas.openxmlformats.org/drawingml/2006/main" xmlns:r="http://schemas.openxmlformats.org/officeDocument/2006/relationships" xmlns:p="http://schemas.openxmlformats.org/presentationml/2006/main">
   <p:cSld>
     <p:spTree>
@@ -4493,7 +6351,7 @@
 </p:sld>
 </file>
 
-<file path=ppt/slides/slide5.xml><?xml version="1.0" encoding="utf-8"?>
+<file path=ppt/slides/slide8.xml><?xml version="1.0" encoding="utf-8"?>
 <p:sld xmlns:a="http://schemas.openxmlformats.org/drawingml/2006/main" xmlns:r="http://schemas.openxmlformats.org/officeDocument/2006/relationships" xmlns:p="http://schemas.openxmlformats.org/presentationml/2006/main">
   <p:cSld>
     <p:spTree>
@@ -4531,7 +6389,10 @@
           <a:bodyPr/>
           <a:lstStyle/>
           <a:p>
-            <a:endParaRPr lang="en-US" dirty="0"/>
+            <a:r>
+              <a:rPr lang="en-US" dirty="0"/>
+              <a:t>Appendix</a:t>
+            </a:r>
           </a:p>
         </p:txBody>
       </p:sp>

</xml_diff>